<commit_message>
Effect size labels fixed from K_Z to Z_K (same with lambda zs)
</commit_message>
<xml_diff>
--- a/Figures/Figs.pptx
+++ b/Figures/Figs.pptx
@@ -198,7 +198,7 @@
           <a:p>
             <a:fld id="{261CEF9C-3B0A-AB49-B9D7-AECD695D5965}" type="datetimeFigureOut">
               <a:rPr lang="en-US" smtClean="0"/>
-              <a:t>4/29/20</a:t>
+              <a:t>5/6/20</a:t>
             </a:fld>
             <a:endParaRPr lang="en-US"/>
           </a:p>
@@ -696,7 +696,7 @@
           <a:p>
             <a:fld id="{B4AB70F6-CC7D-E841-B3D0-31DD80ED8FB9}" type="datetimeFigureOut">
               <a:rPr lang="en-US" smtClean="0"/>
-              <a:t>4/29/20</a:t>
+              <a:t>5/6/20</a:t>
             </a:fld>
             <a:endParaRPr lang="en-US"/>
           </a:p>
@@ -894,7 +894,7 @@
           <a:p>
             <a:fld id="{B4AB70F6-CC7D-E841-B3D0-31DD80ED8FB9}" type="datetimeFigureOut">
               <a:rPr lang="en-US" smtClean="0"/>
-              <a:t>4/29/20</a:t>
+              <a:t>5/6/20</a:t>
             </a:fld>
             <a:endParaRPr lang="en-US"/>
           </a:p>
@@ -1102,7 +1102,7 @@
           <a:p>
             <a:fld id="{B4AB70F6-CC7D-E841-B3D0-31DD80ED8FB9}" type="datetimeFigureOut">
               <a:rPr lang="en-US" smtClean="0"/>
-              <a:t>4/29/20</a:t>
+              <a:t>5/6/20</a:t>
             </a:fld>
             <a:endParaRPr lang="en-US"/>
           </a:p>
@@ -1300,7 +1300,7 @@
           <a:p>
             <a:fld id="{B4AB70F6-CC7D-E841-B3D0-31DD80ED8FB9}" type="datetimeFigureOut">
               <a:rPr lang="en-US" smtClean="0"/>
-              <a:t>4/29/20</a:t>
+              <a:t>5/6/20</a:t>
             </a:fld>
             <a:endParaRPr lang="en-US"/>
           </a:p>
@@ -1575,7 +1575,7 @@
           <a:p>
             <a:fld id="{B4AB70F6-CC7D-E841-B3D0-31DD80ED8FB9}" type="datetimeFigureOut">
               <a:rPr lang="en-US" smtClean="0"/>
-              <a:t>4/29/20</a:t>
+              <a:t>5/6/20</a:t>
             </a:fld>
             <a:endParaRPr lang="en-US"/>
           </a:p>
@@ -1840,7 +1840,7 @@
           <a:p>
             <a:fld id="{B4AB70F6-CC7D-E841-B3D0-31DD80ED8FB9}" type="datetimeFigureOut">
               <a:rPr lang="en-US" smtClean="0"/>
-              <a:t>4/29/20</a:t>
+              <a:t>5/6/20</a:t>
             </a:fld>
             <a:endParaRPr lang="en-US"/>
           </a:p>
@@ -2252,7 +2252,7 @@
           <a:p>
             <a:fld id="{B4AB70F6-CC7D-E841-B3D0-31DD80ED8FB9}" type="datetimeFigureOut">
               <a:rPr lang="en-US" smtClean="0"/>
-              <a:t>4/29/20</a:t>
+              <a:t>5/6/20</a:t>
             </a:fld>
             <a:endParaRPr lang="en-US"/>
           </a:p>
@@ -2393,7 +2393,7 @@
           <a:p>
             <a:fld id="{B4AB70F6-CC7D-E841-B3D0-31DD80ED8FB9}" type="datetimeFigureOut">
               <a:rPr lang="en-US" smtClean="0"/>
-              <a:t>4/29/20</a:t>
+              <a:t>5/6/20</a:t>
             </a:fld>
             <a:endParaRPr lang="en-US"/>
           </a:p>
@@ -2506,7 +2506,7 @@
           <a:p>
             <a:fld id="{B4AB70F6-CC7D-E841-B3D0-31DD80ED8FB9}" type="datetimeFigureOut">
               <a:rPr lang="en-US" smtClean="0"/>
-              <a:t>4/29/20</a:t>
+              <a:t>5/6/20</a:t>
             </a:fld>
             <a:endParaRPr lang="en-US"/>
           </a:p>
@@ -2817,7 +2817,7 @@
           <a:p>
             <a:fld id="{B4AB70F6-CC7D-E841-B3D0-31DD80ED8FB9}" type="datetimeFigureOut">
               <a:rPr lang="en-US" smtClean="0"/>
-              <a:t>4/29/20</a:t>
+              <a:t>5/6/20</a:t>
             </a:fld>
             <a:endParaRPr lang="en-US"/>
           </a:p>
@@ -3105,7 +3105,7 @@
           <a:p>
             <a:fld id="{B4AB70F6-CC7D-E841-B3D0-31DD80ED8FB9}" type="datetimeFigureOut">
               <a:rPr lang="en-US" smtClean="0"/>
-              <a:t>4/29/20</a:t>
+              <a:t>5/6/20</a:t>
             </a:fld>
             <a:endParaRPr lang="en-US"/>
           </a:p>
@@ -3346,7 +3346,7 @@
           <a:p>
             <a:fld id="{B4AB70F6-CC7D-E841-B3D0-31DD80ED8FB9}" type="datetimeFigureOut">
               <a:rPr lang="en-US" smtClean="0"/>
-              <a:t>4/29/20</a:t>
+              <a:t>5/6/20</a:t>
             </a:fld>
             <a:endParaRPr lang="en-US"/>
           </a:p>
@@ -3763,6 +3763,36 @@
           <a:chExt cx="0" cy="0"/>
         </a:xfrm>
       </p:grpSpPr>
+      <p:pic>
+        <p:nvPicPr>
+          <p:cNvPr id="8" name="Picture 7">
+            <a:extLst>
+              <a:ext uri="{FF2B5EF4-FFF2-40B4-BE49-F238E27FC236}">
+                <a16:creationId xmlns:a16="http://schemas.microsoft.com/office/drawing/2014/main" id="{A8DFB833-E016-4A4B-9A26-662EE86DA773}"/>
+              </a:ext>
+            </a:extLst>
+          </p:cNvPr>
+          <p:cNvPicPr>
+            <a:picLocks noChangeAspect="1"/>
+          </p:cNvPicPr>
+          <p:nvPr/>
+        </p:nvPicPr>
+        <p:blipFill>
+          <a:blip r:embed="rId3"/>
+          <a:stretch>
+            <a:fillRect/>
+          </a:stretch>
+        </p:blipFill>
+        <p:spPr>
+          <a:xfrm>
+            <a:off x="136292" y="3119411"/>
+            <a:ext cx="7676405" cy="3838203"/>
+          </a:xfrm>
+          <a:prstGeom prst="rect">
+            <a:avLst/>
+          </a:prstGeom>
+        </p:spPr>
+      </p:pic>
       <p:grpSp>
         <p:nvGrpSpPr>
           <p:cNvPr id="10" name="Group 9">
@@ -3800,7 +3830,7 @@
             <p:nvPr/>
           </p:nvPicPr>
           <p:blipFill rotWithShape="1">
-            <a:blip r:embed="rId3">
+            <a:blip r:embed="rId4">
               <a:alphaModFix amt="30000"/>
             </a:blip>
             <a:srcRect t="30840" b="38351"/>
@@ -4026,7 +4056,7 @@
             <p:nvPr/>
           </p:nvPicPr>
           <p:blipFill rotWithShape="1">
-            <a:blip r:embed="rId3">
+            <a:blip r:embed="rId4">
               <a:alphaModFix amt="30000"/>
             </a:blip>
             <a:srcRect b="72176"/>
@@ -4058,7 +4088,7 @@
             <p:nvPr/>
           </p:nvPicPr>
           <p:blipFill rotWithShape="1">
-            <a:blip r:embed="rId3"/>
+            <a:blip r:embed="rId4"/>
             <a:srcRect t="62896" b="16289"/>
             <a:stretch/>
           </p:blipFill>
@@ -4087,7 +4117,7 @@
             <p:nvPr/>
           </p:nvPicPr>
           <p:blipFill rotWithShape="1">
-            <a:blip r:embed="rId3"/>
+            <a:blip r:embed="rId4"/>
             <a:srcRect t="84185"/>
             <a:stretch/>
           </p:blipFill>
@@ -4116,7 +4146,7 @@
             <p:nvPr/>
           </p:nvPicPr>
           <p:blipFill rotWithShape="1">
-            <a:blip r:embed="rId4"/>
+            <a:blip r:embed="rId5"/>
             <a:srcRect l="46374" t="56012" r="-1" b="30207"/>
             <a:stretch/>
           </p:blipFill>
@@ -4205,35 +4235,6 @@
           </a:p>
         </p:txBody>
       </p:sp>
-      <p:pic>
-        <p:nvPicPr>
-          <p:cNvPr id="5" name="Picture 4">
-            <a:extLst>
-              <a:ext uri="{FF2B5EF4-FFF2-40B4-BE49-F238E27FC236}">
-                <a16:creationId xmlns:a16="http://schemas.microsoft.com/office/drawing/2014/main" id="{97E954AA-71A9-814E-AC9B-5F9077BCCD1F}"/>
-              </a:ext>
-            </a:extLst>
-          </p:cNvPr>
-          <p:cNvPicPr>
-            <a:picLocks noChangeAspect="1"/>
-          </p:cNvPicPr>
-          <p:nvPr/>
-        </p:nvPicPr>
-        <p:blipFill rotWithShape="1">
-          <a:blip r:embed="rId5"/>
-          <a:srcRect t="1" b="1092"/>
-          <a:stretch/>
-        </p:blipFill>
-        <p:spPr>
-          <a:xfrm>
-            <a:off x="137848" y="3089622"/>
-            <a:ext cx="7620000" cy="3768378"/>
-          </a:xfrm>
-          <a:prstGeom prst="rect">
-            <a:avLst/>
-          </a:prstGeom>
-        </p:spPr>
-      </p:pic>
       <p:sp>
         <p:nvSpPr>
           <p:cNvPr id="6" name="Rectangle 5">

</xml_diff>

<commit_message>
Editing figures to use $\kappa$ instead of K
</commit_message>
<xml_diff>
--- a/Figures/Figs.pptx
+++ b/Figures/Figs.pptx
@@ -198,7 +198,7 @@
           <a:p>
             <a:fld id="{261CEF9C-3B0A-AB49-B9D7-AECD695D5965}" type="datetimeFigureOut">
               <a:rPr lang="en-US" smtClean="0"/>
-              <a:t>5/6/20</a:t>
+              <a:t>5/11/20</a:t>
             </a:fld>
             <a:endParaRPr lang="en-US"/>
           </a:p>
@@ -696,7 +696,7 @@
           <a:p>
             <a:fld id="{B4AB70F6-CC7D-E841-B3D0-31DD80ED8FB9}" type="datetimeFigureOut">
               <a:rPr lang="en-US" smtClean="0"/>
-              <a:t>5/6/20</a:t>
+              <a:t>5/11/20</a:t>
             </a:fld>
             <a:endParaRPr lang="en-US"/>
           </a:p>
@@ -894,7 +894,7 @@
           <a:p>
             <a:fld id="{B4AB70F6-CC7D-E841-B3D0-31DD80ED8FB9}" type="datetimeFigureOut">
               <a:rPr lang="en-US" smtClean="0"/>
-              <a:t>5/6/20</a:t>
+              <a:t>5/11/20</a:t>
             </a:fld>
             <a:endParaRPr lang="en-US"/>
           </a:p>
@@ -1102,7 +1102,7 @@
           <a:p>
             <a:fld id="{B4AB70F6-CC7D-E841-B3D0-31DD80ED8FB9}" type="datetimeFigureOut">
               <a:rPr lang="en-US" smtClean="0"/>
-              <a:t>5/6/20</a:t>
+              <a:t>5/11/20</a:t>
             </a:fld>
             <a:endParaRPr lang="en-US"/>
           </a:p>
@@ -1300,7 +1300,7 @@
           <a:p>
             <a:fld id="{B4AB70F6-CC7D-E841-B3D0-31DD80ED8FB9}" type="datetimeFigureOut">
               <a:rPr lang="en-US" smtClean="0"/>
-              <a:t>5/6/20</a:t>
+              <a:t>5/11/20</a:t>
             </a:fld>
             <a:endParaRPr lang="en-US"/>
           </a:p>
@@ -1575,7 +1575,7 @@
           <a:p>
             <a:fld id="{B4AB70F6-CC7D-E841-B3D0-31DD80ED8FB9}" type="datetimeFigureOut">
               <a:rPr lang="en-US" smtClean="0"/>
-              <a:t>5/6/20</a:t>
+              <a:t>5/11/20</a:t>
             </a:fld>
             <a:endParaRPr lang="en-US"/>
           </a:p>
@@ -1840,7 +1840,7 @@
           <a:p>
             <a:fld id="{B4AB70F6-CC7D-E841-B3D0-31DD80ED8FB9}" type="datetimeFigureOut">
               <a:rPr lang="en-US" smtClean="0"/>
-              <a:t>5/6/20</a:t>
+              <a:t>5/11/20</a:t>
             </a:fld>
             <a:endParaRPr lang="en-US"/>
           </a:p>
@@ -2252,7 +2252,7 @@
           <a:p>
             <a:fld id="{B4AB70F6-CC7D-E841-B3D0-31DD80ED8FB9}" type="datetimeFigureOut">
               <a:rPr lang="en-US" smtClean="0"/>
-              <a:t>5/6/20</a:t>
+              <a:t>5/11/20</a:t>
             </a:fld>
             <a:endParaRPr lang="en-US"/>
           </a:p>
@@ -2393,7 +2393,7 @@
           <a:p>
             <a:fld id="{B4AB70F6-CC7D-E841-B3D0-31DD80ED8FB9}" type="datetimeFigureOut">
               <a:rPr lang="en-US" smtClean="0"/>
-              <a:t>5/6/20</a:t>
+              <a:t>5/11/20</a:t>
             </a:fld>
             <a:endParaRPr lang="en-US"/>
           </a:p>
@@ -2506,7 +2506,7 @@
           <a:p>
             <a:fld id="{B4AB70F6-CC7D-E841-B3D0-31DD80ED8FB9}" type="datetimeFigureOut">
               <a:rPr lang="en-US" smtClean="0"/>
-              <a:t>5/6/20</a:t>
+              <a:t>5/11/20</a:t>
             </a:fld>
             <a:endParaRPr lang="en-US"/>
           </a:p>
@@ -2817,7 +2817,7 @@
           <a:p>
             <a:fld id="{B4AB70F6-CC7D-E841-B3D0-31DD80ED8FB9}" type="datetimeFigureOut">
               <a:rPr lang="en-US" smtClean="0"/>
-              <a:t>5/6/20</a:t>
+              <a:t>5/11/20</a:t>
             </a:fld>
             <a:endParaRPr lang="en-US"/>
           </a:p>
@@ -3105,7 +3105,7 @@
           <a:p>
             <a:fld id="{B4AB70F6-CC7D-E841-B3D0-31DD80ED8FB9}" type="datetimeFigureOut">
               <a:rPr lang="en-US" smtClean="0"/>
-              <a:t>5/6/20</a:t>
+              <a:t>5/11/20</a:t>
             </a:fld>
             <a:endParaRPr lang="en-US"/>
           </a:p>
@@ -3346,7 +3346,7 @@
           <a:p>
             <a:fld id="{B4AB70F6-CC7D-E841-B3D0-31DD80ED8FB9}" type="datetimeFigureOut">
               <a:rPr lang="en-US" smtClean="0"/>
-              <a:t>5/6/20</a:t>
+              <a:t>5/11/20</a:t>
             </a:fld>
             <a:endParaRPr lang="en-US"/>
           </a:p>
@@ -3765,10 +3765,10 @@
       </p:grpSpPr>
       <p:pic>
         <p:nvPicPr>
-          <p:cNvPr id="8" name="Picture 7">
-            <a:extLst>
-              <a:ext uri="{FF2B5EF4-FFF2-40B4-BE49-F238E27FC236}">
-                <a16:creationId xmlns:a16="http://schemas.microsoft.com/office/drawing/2014/main" id="{A8DFB833-E016-4A4B-9A26-662EE86DA773}"/>
+          <p:cNvPr id="5" name="Picture 4">
+            <a:extLst>
+              <a:ext uri="{FF2B5EF4-FFF2-40B4-BE49-F238E27FC236}">
+                <a16:creationId xmlns:a16="http://schemas.microsoft.com/office/drawing/2014/main" id="{E7792881-7A19-974C-9917-07E0AAFC4230}"/>
               </a:ext>
             </a:extLst>
           </p:cNvPr>
@@ -3785,8 +3785,8 @@
         </p:blipFill>
         <p:spPr>
           <a:xfrm>
-            <a:off x="136292" y="3119411"/>
-            <a:ext cx="7676405" cy="3838203"/>
+            <a:off x="57152" y="3105018"/>
+            <a:ext cx="7664300" cy="3832150"/>
           </a:xfrm>
           <a:prstGeom prst="rect">
             <a:avLst/>
@@ -4525,10 +4525,10 @@
       </p:grpSpPr>
       <p:pic>
         <p:nvPicPr>
-          <p:cNvPr id="3" name="Picture 2">
-            <a:extLst>
-              <a:ext uri="{FF2B5EF4-FFF2-40B4-BE49-F238E27FC236}">
-                <a16:creationId xmlns:a16="http://schemas.microsoft.com/office/drawing/2014/main" id="{284AD26E-CAAE-8144-8654-1225BA21D3F7}"/>
+          <p:cNvPr id="4" name="Picture 3">
+            <a:extLst>
+              <a:ext uri="{FF2B5EF4-FFF2-40B4-BE49-F238E27FC236}">
+                <a16:creationId xmlns:a16="http://schemas.microsoft.com/office/drawing/2014/main" id="{38E102E6-930E-A949-B1B2-49EB7D7C7C86}"/>
               </a:ext>
             </a:extLst>
           </p:cNvPr>
@@ -4545,7 +4545,7 @@
         </p:blipFill>
         <p:spPr>
           <a:xfrm>
-            <a:off x="2667000" y="37071"/>
+            <a:off x="2642286" y="36820"/>
             <a:ext cx="6766560" cy="6766560"/>
           </a:xfrm>
           <a:prstGeom prst="rect">
@@ -4573,9 +4573,9 @@
           <p:nvPr/>
         </p:nvCxnSpPr>
         <p:spPr>
-          <a:xfrm>
-            <a:off x="2656703" y="4571998"/>
-            <a:ext cx="6776857" cy="0"/>
+          <a:xfrm flipV="1">
+            <a:off x="2625102" y="4531628"/>
+            <a:ext cx="6783744" cy="3048"/>
           </a:xfrm>
           <a:prstGeom prst="line">
             <a:avLst/>
@@ -4613,8 +4613,8 @@
         </p:nvCxnSpPr>
         <p:spPr>
           <a:xfrm flipV="1">
-            <a:off x="6036632" y="23423"/>
-            <a:ext cx="0" cy="4548575"/>
+            <a:off x="6036632" y="32774"/>
+            <a:ext cx="0" cy="4497858"/>
           </a:xfrm>
           <a:prstGeom prst="line">
             <a:avLst/>

</xml_diff>